<commit_message>
Figure charge_deposition_grid.jpg in Doxygen doc
</commit_message>
<xml_diff>
--- a/Doxygen/images/charge_deposition_grid.pptx
+++ b/Doxygen/images/charge_deposition_grid.pptx
@@ -288,7 +288,7 @@
           <a:p>
             <a:fld id="{A70671F2-EB6B-BB48-9387-AE6DE57B27F8}" type="datetimeFigureOut">
               <a:rPr lang="en-US" smtClean="0"/>
-              <a:t>9/24/16</a:t>
+              <a:t>10/10/16</a:t>
             </a:fld>
             <a:endParaRPr lang="en-US"/>
           </a:p>
@@ -458,7 +458,7 @@
           <a:p>
             <a:fld id="{A70671F2-EB6B-BB48-9387-AE6DE57B27F8}" type="datetimeFigureOut">
               <a:rPr lang="en-US" smtClean="0"/>
-              <a:t>9/24/16</a:t>
+              <a:t>10/10/16</a:t>
             </a:fld>
             <a:endParaRPr lang="en-US"/>
           </a:p>
@@ -638,7 +638,7 @@
           <a:p>
             <a:fld id="{A70671F2-EB6B-BB48-9387-AE6DE57B27F8}" type="datetimeFigureOut">
               <a:rPr lang="en-US" smtClean="0"/>
-              <a:t>9/24/16</a:t>
+              <a:t>10/10/16</a:t>
             </a:fld>
             <a:endParaRPr lang="en-US"/>
           </a:p>
@@ -808,7 +808,7 @@
           <a:p>
             <a:fld id="{A70671F2-EB6B-BB48-9387-AE6DE57B27F8}" type="datetimeFigureOut">
               <a:rPr lang="en-US" smtClean="0"/>
-              <a:t>9/24/16</a:t>
+              <a:t>10/10/16</a:t>
             </a:fld>
             <a:endParaRPr lang="en-US"/>
           </a:p>
@@ -1054,7 +1054,7 @@
           <a:p>
             <a:fld id="{A70671F2-EB6B-BB48-9387-AE6DE57B27F8}" type="datetimeFigureOut">
               <a:rPr lang="en-US" smtClean="0"/>
-              <a:t>9/24/16</a:t>
+              <a:t>10/10/16</a:t>
             </a:fld>
             <a:endParaRPr lang="en-US"/>
           </a:p>
@@ -1342,7 +1342,7 @@
           <a:p>
             <a:fld id="{A70671F2-EB6B-BB48-9387-AE6DE57B27F8}" type="datetimeFigureOut">
               <a:rPr lang="en-US" smtClean="0"/>
-              <a:t>9/24/16</a:t>
+              <a:t>10/10/16</a:t>
             </a:fld>
             <a:endParaRPr lang="en-US"/>
           </a:p>
@@ -1764,7 +1764,7 @@
           <a:p>
             <a:fld id="{A70671F2-EB6B-BB48-9387-AE6DE57B27F8}" type="datetimeFigureOut">
               <a:rPr lang="en-US" smtClean="0"/>
-              <a:t>9/24/16</a:t>
+              <a:t>10/10/16</a:t>
             </a:fld>
             <a:endParaRPr lang="en-US"/>
           </a:p>
@@ -1882,7 +1882,7 @@
           <a:p>
             <a:fld id="{A70671F2-EB6B-BB48-9387-AE6DE57B27F8}" type="datetimeFigureOut">
               <a:rPr lang="en-US" smtClean="0"/>
-              <a:t>9/24/16</a:t>
+              <a:t>10/10/16</a:t>
             </a:fld>
             <a:endParaRPr lang="en-US"/>
           </a:p>
@@ -1977,7 +1977,7 @@
           <a:p>
             <a:fld id="{A70671F2-EB6B-BB48-9387-AE6DE57B27F8}" type="datetimeFigureOut">
               <a:rPr lang="en-US" smtClean="0"/>
-              <a:t>9/24/16</a:t>
+              <a:t>10/10/16</a:t>
             </a:fld>
             <a:endParaRPr lang="en-US"/>
           </a:p>
@@ -2254,7 +2254,7 @@
           <a:p>
             <a:fld id="{A70671F2-EB6B-BB48-9387-AE6DE57B27F8}" type="datetimeFigureOut">
               <a:rPr lang="en-US" smtClean="0"/>
-              <a:t>9/24/16</a:t>
+              <a:t>10/10/16</a:t>
             </a:fld>
             <a:endParaRPr lang="en-US"/>
           </a:p>
@@ -2507,7 +2507,7 @@
           <a:p>
             <a:fld id="{A70671F2-EB6B-BB48-9387-AE6DE57B27F8}" type="datetimeFigureOut">
               <a:rPr lang="en-US" smtClean="0"/>
-              <a:t>9/24/16</a:t>
+              <a:t>10/10/16</a:t>
             </a:fld>
             <a:endParaRPr lang="en-US"/>
           </a:p>
@@ -2720,7 +2720,7 @@
           <a:p>
             <a:fld id="{A70671F2-EB6B-BB48-9387-AE6DE57B27F8}" type="datetimeFigureOut">
               <a:rPr lang="en-US" smtClean="0"/>
-              <a:t>9/24/16</a:t>
+              <a:t>10/10/16</a:t>
             </a:fld>
             <a:endParaRPr lang="en-US"/>
           </a:p>
@@ -6753,7 +6753,7 @@
         <p:spPr>
           <a:xfrm>
             <a:off x="7820650" y="1986824"/>
-            <a:ext cx="0" cy="3017960"/>
+            <a:ext cx="0" cy="2426943"/>
           </a:xfrm>
           <a:prstGeom prst="straightConnector1">
             <a:avLst/>
@@ -6907,13 +6907,8 @@
             <a:pPr algn="r"/>
             <a:r>
               <a:rPr lang="en-US" dirty="0" smtClean="0"/>
-              <a:t>Nxguard+nx</a:t>
-            </a:r>
-            <a:r>
-              <a:rPr lang="en-US" dirty="0" smtClean="0"/>
-              <a:t>+1</a:t>
-            </a:r>
-            <a:endParaRPr lang="en-US" dirty="0" smtClean="0"/>
+              <a:t>Nxguard+nx+1</a:t>
+            </a:r>
           </a:p>
         </p:txBody>
       </p:sp>

</xml_diff>